<commit_message>
Penultimate Innovation Book Slide Deck
</commit_message>
<xml_diff>
--- a/Other/Innovation_and_Stagnation_Brainstorm_v00.000.0011_MAJOR_RELEASE.pptx
+++ b/Other/Innovation_and_Stagnation_Brainstorm_v00.000.0011_MAJOR_RELEASE.pptx
@@ -5,12 +5,13 @@
     <p:sldMasterId id="2147483648" r:id="rId1"/>
   </p:sldMasterIdLst>
   <p:notesMasterIdLst>
-    <p:notesMasterId r:id="rId5"/>
+    <p:notesMasterId r:id="rId6"/>
   </p:notesMasterIdLst>
   <p:sldIdLst>
     <p:sldId id="256" r:id="rId2"/>
     <p:sldId id="257" r:id="rId3"/>
     <p:sldId id="258" r:id="rId4"/>
+    <p:sldId id="259" r:id="rId5"/>
   </p:sldIdLst>
   <p:sldSz cx="12192000" cy="6858000"/>
   <p:notesSz cx="6858000" cy="9144000"/>
@@ -3901,7 +3902,7 @@
                 </a:solidFill>
                 <a:latin typeface="Magneto" panose="04030805050802020D02" pitchFamily="82" charset="0"/>
               </a:rPr>
-              <a:t>The Innovation Zion Lifecycle Model</a:t>
+              <a:t>The Innovation Eden Lifecycle Model</a:t>
             </a:r>
           </a:p>
         </p:txBody>
@@ -11661,6 +11662,115 @@
     <p:extLst>
       <p:ext uri="{BB962C8B-B14F-4D97-AF65-F5344CB8AC3E}">
         <p14:creationId xmlns:p14="http://schemas.microsoft.com/office/powerpoint/2010/main" val="2275463504"/>
+      </p:ext>
+    </p:extLst>
+  </p:cSld>
+  <p:clrMapOvr>
+    <a:masterClrMapping/>
+  </p:clrMapOvr>
+</p:sld>
+</file>
+
+<file path=ppt/slides/slide4.xml><?xml version="1.0" encoding="utf-8"?>
+<p:sld xmlns:a="http://schemas.openxmlformats.org/drawingml/2006/main" xmlns:r="http://schemas.openxmlformats.org/officeDocument/2006/relationships" xmlns:p="http://schemas.openxmlformats.org/presentationml/2006/main">
+  <p:cSld>
+    <p:spTree>
+      <p:nvGrpSpPr>
+        <p:cNvPr id="1" name=""/>
+        <p:cNvGrpSpPr/>
+        <p:nvPr/>
+      </p:nvGrpSpPr>
+      <p:grpSpPr>
+        <a:xfrm>
+          <a:off x="0" y="0"/>
+          <a:ext cx="0" cy="0"/>
+          <a:chOff x="0" y="0"/>
+          <a:chExt cx="0" cy="0"/>
+        </a:xfrm>
+      </p:grpSpPr>
+      <p:sp>
+        <p:nvSpPr>
+          <p:cNvPr id="4" name="TextBox 3">
+            <a:extLst>
+              <a:ext uri="{FF2B5EF4-FFF2-40B4-BE49-F238E27FC236}">
+                <a16:creationId xmlns:a16="http://schemas.microsoft.com/office/drawing/2014/main" id="{3C460E84-C554-090F-5C13-DDFA00E0EB86}"/>
+              </a:ext>
+            </a:extLst>
+          </p:cNvPr>
+          <p:cNvSpPr txBox="1"/>
+          <p:nvPr/>
+        </p:nvSpPr>
+        <p:spPr>
+          <a:xfrm>
+            <a:off x="0" y="0"/>
+            <a:ext cx="12192000" cy="769441"/>
+          </a:xfrm>
+          <a:prstGeom prst="rect">
+            <a:avLst/>
+          </a:prstGeom>
+          <a:noFill/>
+        </p:spPr>
+        <p:txBody>
+          <a:bodyPr wrap="square" rtlCol="0">
+            <a:spAutoFit/>
+          </a:bodyPr>
+          <a:lstStyle/>
+          <a:p>
+            <a:r>
+              <a:rPr lang="en-GB" sz="4400" dirty="0">
+                <a:solidFill>
+                  <a:schemeClr val="accent2">
+                    <a:lumMod val="60000"/>
+                    <a:lumOff val="40000"/>
+                  </a:schemeClr>
+                </a:solidFill>
+                <a:latin typeface="Magneto" panose="04030805050802020D02" pitchFamily="82" charset="0"/>
+              </a:rPr>
+              <a:t>The Innovation Zion Optimal Process</a:t>
+            </a:r>
+          </a:p>
+        </p:txBody>
+      </p:sp>
+      <p:sp>
+        <p:nvSpPr>
+          <p:cNvPr id="5" name="TextBox 4">
+            <a:extLst>
+              <a:ext uri="{FF2B5EF4-FFF2-40B4-BE49-F238E27FC236}">
+                <a16:creationId xmlns:a16="http://schemas.microsoft.com/office/drawing/2014/main" id="{AC4F77FD-FA66-91EC-C438-EA1C7B2E634C}"/>
+              </a:ext>
+            </a:extLst>
+          </p:cNvPr>
+          <p:cNvSpPr txBox="1"/>
+          <p:nvPr/>
+        </p:nvSpPr>
+        <p:spPr>
+          <a:xfrm>
+            <a:off x="5771231" y="3244334"/>
+            <a:ext cx="649537" cy="369332"/>
+          </a:xfrm>
+          <a:prstGeom prst="rect">
+            <a:avLst/>
+          </a:prstGeom>
+          <a:noFill/>
+        </p:spPr>
+        <p:txBody>
+          <a:bodyPr wrap="none" rtlCol="0">
+            <a:spAutoFit/>
+          </a:bodyPr>
+          <a:lstStyle/>
+          <a:p>
+            <a:pPr algn="ctr"/>
+            <a:r>
+              <a:rPr lang="en-GB" dirty="0"/>
+              <a:t>TBO!</a:t>
+            </a:r>
+          </a:p>
+        </p:txBody>
+      </p:sp>
+    </p:spTree>
+    <p:extLst>
+      <p:ext uri="{BB962C8B-B14F-4D97-AF65-F5344CB8AC3E}">
+        <p14:creationId xmlns:p14="http://schemas.microsoft.com/office/powerpoint/2010/main" val="63497800"/>
       </p:ext>
     </p:extLst>
   </p:cSld>

</xml_diff>